<commit_message>
Add bonus point alert
</commit_message>
<xml_diff>
--- a/Computer Science Discoveries/Projects/Project 3/Project 3 Rubrics.pptx
+++ b/Computer Science Discoveries/Projects/Project 3/Project 3 Rubrics.pptx
@@ -5,8 +5,8 @@
     <p:sldMasterId id="2147483648" r:id="rId1"/>
   </p:sldMasterIdLst>
   <p:sldIdLst>
-    <p:sldId id="257" r:id="rId3"/>
-    <p:sldId id="260" r:id="rId4"/>
+    <p:sldId id="257" r:id="rId2"/>
+    <p:sldId id="260" r:id="rId3"/>
   </p:sldIdLst>
   <p:sldSz cx="12192000" cy="6858000"/>
   <p:notesSz cx="6858000" cy="9144000"/>
@@ -105,7 +105,49 @@
       </a:defRPr>
     </a:lvl9pPr>
   </p:defaultTextStyle>
+  <p:extLst>
+    <p:ext uri="{EFAFB233-063F-42B5-8137-9DF3F51BA10A}">
+      <p15:sldGuideLst xmlns:p15="http://schemas.microsoft.com/office/powerpoint/2012/main"/>
+    </p:ext>
+  </p:extLst>
 </p:presentation>
+</file>
+
+<file path=ppt/changesInfos/changesInfo1.xml><?xml version="1.0" encoding="utf-8"?>
+<pc:chgInfo xmlns:a="http://schemas.openxmlformats.org/drawingml/2006/main" xmlns:r="http://schemas.openxmlformats.org/officeDocument/2006/relationships" xmlns:ac="http://schemas.microsoft.com/office/drawing/2013/main/command" xmlns:pc="http://schemas.microsoft.com/office/powerpoint/2013/main/command">
+  <pc:docChgLst>
+    <pc:chgData name="Joshua Gross" userId="7bb6a70e-9d37-46e4-96de-748557707bd0" providerId="ADAL" clId="{9788E17C-159B-4644-BF10-8C1C8A206954}"/>
+    <pc:docChg chg="custSel modSld">
+      <pc:chgData name="Joshua Gross" userId="7bb6a70e-9d37-46e4-96de-748557707bd0" providerId="ADAL" clId="{9788E17C-159B-4644-BF10-8C1C8A206954}" dt="2023-09-25T21:28:47.948" v="120" actId="13822"/>
+      <pc:docMkLst>
+        <pc:docMk/>
+      </pc:docMkLst>
+      <pc:sldChg chg="addSp modSp">
+        <pc:chgData name="Joshua Gross" userId="7bb6a70e-9d37-46e4-96de-748557707bd0" providerId="ADAL" clId="{9788E17C-159B-4644-BF10-8C1C8A206954}" dt="2023-09-25T21:28:47.948" v="120" actId="13822"/>
+        <pc:sldMkLst>
+          <pc:docMk/>
+          <pc:sldMk cId="0" sldId="257"/>
+        </pc:sldMkLst>
+        <pc:spChg chg="add mod">
+          <ac:chgData name="Joshua Gross" userId="7bb6a70e-9d37-46e4-96de-748557707bd0" providerId="ADAL" clId="{9788E17C-159B-4644-BF10-8C1C8A206954}" dt="2023-09-25T21:28:47.948" v="120" actId="13822"/>
+          <ac:spMkLst>
+            <pc:docMk/>
+            <pc:sldMk cId="0" sldId="257"/>
+            <ac:spMk id="2" creationId="{75A141FB-0E86-4FCA-9332-AB79C4E3501B}"/>
+          </ac:spMkLst>
+        </pc:spChg>
+        <pc:spChg chg="mod">
+          <ac:chgData name="Joshua Gross" userId="7bb6a70e-9d37-46e4-96de-748557707bd0" providerId="ADAL" clId="{9788E17C-159B-4644-BF10-8C1C8A206954}" dt="2023-09-25T21:27:46.393" v="111" actId="120"/>
+          <ac:spMkLst>
+            <pc:docMk/>
+            <pc:sldMk cId="0" sldId="257"/>
+            <ac:spMk id="4" creationId="{00000000-0000-0000-0000-000000000000}"/>
+          </ac:spMkLst>
+        </pc:spChg>
+      </pc:sldChg>
+    </pc:docChg>
+  </pc:docChgLst>
+</pc:chgInfo>
 </file>
 
 <file path=ppt/slideLayouts/slideLayout1.xml><?xml version="1.0" encoding="utf-8"?>
@@ -150,10 +192,9 @@
           </a:lstStyle>
           <a:p>
             <a:r>
-              <a:rPr lang="en-US" smtClean="0"/>
+              <a:rPr lang="en-US"/>
               <a:t>Click to edit Master title style</a:t>
             </a:r>
-            <a:endParaRPr lang="en-US"/>
           </a:p>
         </p:txBody>
       </p:sp>
@@ -215,10 +256,9 @@
           </a:lstStyle>
           <a:p>
             <a:r>
-              <a:rPr lang="en-US" smtClean="0"/>
+              <a:rPr lang="en-US"/>
               <a:t>Click to edit Master subtitle style</a:t>
             </a:r>
-            <a:endParaRPr lang="en-US"/>
           </a:p>
         </p:txBody>
       </p:sp>
@@ -239,6 +279,7 @@
           <a:p>
             <a:fld id="{63A1C593-65D0-4073-BCC9-577B9352EA97}" type="datetimeFigureOut">
               <a:rPr lang="en-US" smtClean="0"/>
+              <a:t>9/25/2023</a:t>
             </a:fld>
             <a:endParaRPr lang="en-US"/>
           </a:p>
@@ -280,6 +321,7 @@
           <a:p>
             <a:fld id="{9B618960-8005-486C-9A75-10CB2AAC16F9}" type="slidenum">
               <a:rPr lang="en-US" smtClean="0"/>
+              <a:t>‹#›</a:t>
             </a:fld>
             <a:endParaRPr lang="en-US"/>
           </a:p>
@@ -326,10 +368,9 @@
           <a:lstStyle/>
           <a:p>
             <a:r>
-              <a:rPr lang="en-US" smtClean="0"/>
+              <a:rPr lang="en-US"/>
               <a:t>Click to edit Master title style</a:t>
             </a:r>
-            <a:endParaRPr lang="en-US"/>
           </a:p>
         </p:txBody>
       </p:sp>
@@ -350,42 +391,37 @@
           <a:p>
             <a:pPr lvl="0"/>
             <a:r>
-              <a:rPr lang="en-US" smtClean="0"/>
+              <a:rPr lang="en-US"/>
               <a:t>Click to edit Master text styles</a:t>
             </a:r>
-            <a:endParaRPr lang="en-US" smtClean="0"/>
           </a:p>
           <a:p>
             <a:pPr lvl="1"/>
             <a:r>
-              <a:rPr lang="en-US" smtClean="0"/>
+              <a:rPr lang="en-US"/>
               <a:t>Second level</a:t>
             </a:r>
-            <a:endParaRPr lang="en-US" smtClean="0"/>
           </a:p>
           <a:p>
             <a:pPr lvl="2"/>
             <a:r>
-              <a:rPr lang="en-US" smtClean="0"/>
+              <a:rPr lang="en-US"/>
               <a:t>Third level</a:t>
             </a:r>
-            <a:endParaRPr lang="en-US" smtClean="0"/>
           </a:p>
           <a:p>
             <a:pPr lvl="3"/>
             <a:r>
-              <a:rPr lang="en-US" smtClean="0"/>
+              <a:rPr lang="en-US"/>
               <a:t>Fourth level</a:t>
             </a:r>
-            <a:endParaRPr lang="en-US" smtClean="0"/>
           </a:p>
           <a:p>
             <a:pPr lvl="4"/>
             <a:r>
-              <a:rPr lang="en-US" smtClean="0"/>
+              <a:rPr lang="en-US"/>
               <a:t>Fifth level</a:t>
             </a:r>
-            <a:endParaRPr lang="en-US"/>
           </a:p>
         </p:txBody>
       </p:sp>
@@ -406,6 +442,7 @@
           <a:p>
             <a:fld id="{63A1C593-65D0-4073-BCC9-577B9352EA97}" type="datetimeFigureOut">
               <a:rPr lang="en-US" smtClean="0"/>
+              <a:t>9/25/2023</a:t>
             </a:fld>
             <a:endParaRPr lang="en-US"/>
           </a:p>
@@ -447,6 +484,7 @@
           <a:p>
             <a:fld id="{9B618960-8005-486C-9A75-10CB2AAC16F9}" type="slidenum">
               <a:rPr lang="en-US" smtClean="0"/>
+              <a:t>‹#›</a:t>
             </a:fld>
             <a:endParaRPr lang="en-US"/>
           </a:p>
@@ -498,10 +536,9 @@
           <a:lstStyle/>
           <a:p>
             <a:r>
-              <a:rPr lang="en-US" smtClean="0"/>
+              <a:rPr lang="en-US"/>
               <a:t>Click to edit Master title style</a:t>
             </a:r>
-            <a:endParaRPr lang="en-US"/>
           </a:p>
         </p:txBody>
       </p:sp>
@@ -527,42 +564,37 @@
           <a:p>
             <a:pPr lvl="0"/>
             <a:r>
-              <a:rPr lang="en-US" smtClean="0"/>
+              <a:rPr lang="en-US"/>
               <a:t>Click to edit Master text styles</a:t>
             </a:r>
-            <a:endParaRPr lang="en-US" smtClean="0"/>
           </a:p>
           <a:p>
             <a:pPr lvl="1"/>
             <a:r>
-              <a:rPr lang="en-US" smtClean="0"/>
+              <a:rPr lang="en-US"/>
               <a:t>Second level</a:t>
             </a:r>
-            <a:endParaRPr lang="en-US" smtClean="0"/>
           </a:p>
           <a:p>
             <a:pPr lvl="2"/>
             <a:r>
-              <a:rPr lang="en-US" smtClean="0"/>
+              <a:rPr lang="en-US"/>
               <a:t>Third level</a:t>
             </a:r>
-            <a:endParaRPr lang="en-US" smtClean="0"/>
           </a:p>
           <a:p>
             <a:pPr lvl="3"/>
             <a:r>
-              <a:rPr lang="en-US" smtClean="0"/>
+              <a:rPr lang="en-US"/>
               <a:t>Fourth level</a:t>
             </a:r>
-            <a:endParaRPr lang="en-US" smtClean="0"/>
           </a:p>
           <a:p>
             <a:pPr lvl="4"/>
             <a:r>
-              <a:rPr lang="en-US" smtClean="0"/>
+              <a:rPr lang="en-US"/>
               <a:t>Fifth level</a:t>
             </a:r>
-            <a:endParaRPr lang="en-US"/>
           </a:p>
         </p:txBody>
       </p:sp>
@@ -583,6 +615,7 @@
           <a:p>
             <a:fld id="{63A1C593-65D0-4073-BCC9-577B9352EA97}" type="datetimeFigureOut">
               <a:rPr lang="en-US" smtClean="0"/>
+              <a:t>9/25/2023</a:t>
             </a:fld>
             <a:endParaRPr lang="en-US"/>
           </a:p>
@@ -624,6 +657,7 @@
           <a:p>
             <a:fld id="{9B618960-8005-486C-9A75-10CB2AAC16F9}" type="slidenum">
               <a:rPr lang="en-US" smtClean="0"/>
+              <a:t>‹#›</a:t>
             </a:fld>
             <a:endParaRPr lang="en-US"/>
           </a:p>
@@ -670,10 +704,9 @@
           <a:lstStyle/>
           <a:p>
             <a:r>
-              <a:rPr lang="en-US" smtClean="0"/>
+              <a:rPr lang="en-US"/>
               <a:t>Click to edit Master title style</a:t>
             </a:r>
-            <a:endParaRPr lang="en-US"/>
           </a:p>
         </p:txBody>
       </p:sp>
@@ -694,42 +727,37 @@
           <a:p>
             <a:pPr lvl="0"/>
             <a:r>
-              <a:rPr lang="en-US" smtClean="0"/>
+              <a:rPr lang="en-US"/>
               <a:t>Click to edit Master text styles</a:t>
             </a:r>
-            <a:endParaRPr lang="en-US" smtClean="0"/>
           </a:p>
           <a:p>
             <a:pPr lvl="1"/>
             <a:r>
-              <a:rPr lang="en-US" smtClean="0"/>
+              <a:rPr lang="en-US"/>
               <a:t>Second level</a:t>
             </a:r>
-            <a:endParaRPr lang="en-US" smtClean="0"/>
           </a:p>
           <a:p>
             <a:pPr lvl="2"/>
             <a:r>
-              <a:rPr lang="en-US" smtClean="0"/>
+              <a:rPr lang="en-US"/>
               <a:t>Third level</a:t>
             </a:r>
-            <a:endParaRPr lang="en-US" smtClean="0"/>
           </a:p>
           <a:p>
             <a:pPr lvl="3"/>
             <a:r>
-              <a:rPr lang="en-US" smtClean="0"/>
+              <a:rPr lang="en-US"/>
               <a:t>Fourth level</a:t>
             </a:r>
-            <a:endParaRPr lang="en-US" smtClean="0"/>
           </a:p>
           <a:p>
             <a:pPr lvl="4"/>
             <a:r>
-              <a:rPr lang="en-US" smtClean="0"/>
+              <a:rPr lang="en-US"/>
               <a:t>Fifth level</a:t>
             </a:r>
-            <a:endParaRPr lang="en-US"/>
           </a:p>
         </p:txBody>
       </p:sp>
@@ -750,6 +778,7 @@
           <a:p>
             <a:fld id="{63A1C593-65D0-4073-BCC9-577B9352EA97}" type="datetimeFigureOut">
               <a:rPr lang="en-US" smtClean="0"/>
+              <a:t>9/25/2023</a:t>
             </a:fld>
             <a:endParaRPr lang="en-US"/>
           </a:p>
@@ -791,6 +820,7 @@
           <a:p>
             <a:fld id="{9B618960-8005-486C-9A75-10CB2AAC16F9}" type="slidenum">
               <a:rPr lang="en-US" smtClean="0"/>
+              <a:t>‹#›</a:t>
             </a:fld>
             <a:endParaRPr lang="en-US"/>
           </a:p>
@@ -837,10 +867,9 @@
           <a:lstStyle/>
           <a:p>
             <a:r>
-              <a:rPr lang="en-US" smtClean="0"/>
+              <a:rPr lang="en-US"/>
               <a:t>Click to edit Master title style</a:t>
             </a:r>
-            <a:endParaRPr lang="en-US"/>
           </a:p>
         </p:txBody>
       </p:sp>
@@ -861,42 +890,37 @@
           <a:p>
             <a:pPr lvl="0"/>
             <a:r>
-              <a:rPr lang="en-US" smtClean="0"/>
+              <a:rPr lang="en-US"/>
               <a:t>Click to edit Master text styles</a:t>
             </a:r>
-            <a:endParaRPr lang="en-US" smtClean="0"/>
           </a:p>
           <a:p>
             <a:pPr lvl="1"/>
             <a:r>
-              <a:rPr lang="en-US" smtClean="0"/>
+              <a:rPr lang="en-US"/>
               <a:t>Second level</a:t>
             </a:r>
-            <a:endParaRPr lang="en-US" smtClean="0"/>
           </a:p>
           <a:p>
             <a:pPr lvl="2"/>
             <a:r>
-              <a:rPr lang="en-US" smtClean="0"/>
+              <a:rPr lang="en-US"/>
               <a:t>Third level</a:t>
             </a:r>
-            <a:endParaRPr lang="en-US" smtClean="0"/>
           </a:p>
           <a:p>
             <a:pPr lvl="3"/>
             <a:r>
-              <a:rPr lang="en-US" smtClean="0"/>
+              <a:rPr lang="en-US"/>
               <a:t>Fourth level</a:t>
             </a:r>
-            <a:endParaRPr lang="en-US" smtClean="0"/>
           </a:p>
           <a:p>
             <a:pPr lvl="4"/>
             <a:r>
-              <a:rPr lang="en-US" smtClean="0"/>
+              <a:rPr lang="en-US"/>
               <a:t>Fifth level</a:t>
             </a:r>
-            <a:endParaRPr lang="en-US"/>
           </a:p>
         </p:txBody>
       </p:sp>
@@ -917,6 +941,7 @@
           <a:p>
             <a:fld id="{63A1C593-65D0-4073-BCC9-577B9352EA97}" type="datetimeFigureOut">
               <a:rPr lang="en-US" smtClean="0"/>
+              <a:t>9/25/2023</a:t>
             </a:fld>
             <a:endParaRPr lang="en-US"/>
           </a:p>
@@ -958,6 +983,7 @@
           <a:p>
             <a:fld id="{9B618960-8005-486C-9A75-10CB2AAC16F9}" type="slidenum">
               <a:rPr lang="en-US" smtClean="0"/>
+              <a:t>‹#›</a:t>
             </a:fld>
             <a:endParaRPr lang="en-US"/>
           </a:p>
@@ -1013,10 +1039,9 @@
           </a:lstStyle>
           <a:p>
             <a:r>
-              <a:rPr lang="en-US" smtClean="0"/>
+              <a:rPr lang="en-US"/>
               <a:t>Click to edit Master title style</a:t>
             </a:r>
-            <a:endParaRPr lang="en-US"/>
           </a:p>
         </p:txBody>
       </p:sp>
@@ -1133,10 +1158,9 @@
           <a:p>
             <a:pPr lvl="0"/>
             <a:r>
-              <a:rPr lang="en-US" smtClean="0"/>
+              <a:rPr lang="en-US"/>
               <a:t>Click to edit Master text styles</a:t>
             </a:r>
-            <a:endParaRPr lang="en-US" smtClean="0"/>
           </a:p>
         </p:txBody>
       </p:sp>
@@ -1157,6 +1181,7 @@
           <a:p>
             <a:fld id="{63A1C593-65D0-4073-BCC9-577B9352EA97}" type="datetimeFigureOut">
               <a:rPr lang="en-US" smtClean="0"/>
+              <a:t>9/25/2023</a:t>
             </a:fld>
             <a:endParaRPr lang="en-US"/>
           </a:p>
@@ -1198,6 +1223,7 @@
           <a:p>
             <a:fld id="{9B618960-8005-486C-9A75-10CB2AAC16F9}" type="slidenum">
               <a:rPr lang="en-US" smtClean="0"/>
+              <a:t>‹#›</a:t>
             </a:fld>
             <a:endParaRPr lang="en-US"/>
           </a:p>
@@ -1244,10 +1270,9 @@
           <a:lstStyle/>
           <a:p>
             <a:r>
-              <a:rPr lang="en-US" smtClean="0"/>
+              <a:rPr lang="en-US"/>
               <a:t>Click to edit Master title style</a:t>
             </a:r>
-            <a:endParaRPr lang="en-US"/>
           </a:p>
         </p:txBody>
       </p:sp>
@@ -1273,42 +1298,37 @@
           <a:p>
             <a:pPr lvl="0"/>
             <a:r>
-              <a:rPr lang="en-US" smtClean="0"/>
+              <a:rPr lang="en-US"/>
               <a:t>Click to edit Master text styles</a:t>
             </a:r>
-            <a:endParaRPr lang="en-US" smtClean="0"/>
           </a:p>
           <a:p>
             <a:pPr lvl="1"/>
             <a:r>
-              <a:rPr lang="en-US" smtClean="0"/>
+              <a:rPr lang="en-US"/>
               <a:t>Second level</a:t>
             </a:r>
-            <a:endParaRPr lang="en-US" smtClean="0"/>
           </a:p>
           <a:p>
             <a:pPr lvl="2"/>
             <a:r>
-              <a:rPr lang="en-US" smtClean="0"/>
+              <a:rPr lang="en-US"/>
               <a:t>Third level</a:t>
             </a:r>
-            <a:endParaRPr lang="en-US" smtClean="0"/>
           </a:p>
           <a:p>
             <a:pPr lvl="3"/>
             <a:r>
-              <a:rPr lang="en-US" smtClean="0"/>
+              <a:rPr lang="en-US"/>
               <a:t>Fourth level</a:t>
             </a:r>
-            <a:endParaRPr lang="en-US" smtClean="0"/>
           </a:p>
           <a:p>
             <a:pPr lvl="4"/>
             <a:r>
-              <a:rPr lang="en-US" smtClean="0"/>
+              <a:rPr lang="en-US"/>
               <a:t>Fifth level</a:t>
             </a:r>
-            <a:endParaRPr lang="en-US"/>
           </a:p>
         </p:txBody>
       </p:sp>
@@ -1334,42 +1354,37 @@
           <a:p>
             <a:pPr lvl="0"/>
             <a:r>
-              <a:rPr lang="en-US" smtClean="0"/>
+              <a:rPr lang="en-US"/>
               <a:t>Click to edit Master text styles</a:t>
             </a:r>
-            <a:endParaRPr lang="en-US" smtClean="0"/>
           </a:p>
           <a:p>
             <a:pPr lvl="1"/>
             <a:r>
-              <a:rPr lang="en-US" smtClean="0"/>
+              <a:rPr lang="en-US"/>
               <a:t>Second level</a:t>
             </a:r>
-            <a:endParaRPr lang="en-US" smtClean="0"/>
           </a:p>
           <a:p>
             <a:pPr lvl="2"/>
             <a:r>
-              <a:rPr lang="en-US" smtClean="0"/>
+              <a:rPr lang="en-US"/>
               <a:t>Third level</a:t>
             </a:r>
-            <a:endParaRPr lang="en-US" smtClean="0"/>
           </a:p>
           <a:p>
             <a:pPr lvl="3"/>
             <a:r>
-              <a:rPr lang="en-US" smtClean="0"/>
+              <a:rPr lang="en-US"/>
               <a:t>Fourth level</a:t>
             </a:r>
-            <a:endParaRPr lang="en-US" smtClean="0"/>
           </a:p>
           <a:p>
             <a:pPr lvl="4"/>
             <a:r>
-              <a:rPr lang="en-US" smtClean="0"/>
+              <a:rPr lang="en-US"/>
               <a:t>Fifth level</a:t>
             </a:r>
-            <a:endParaRPr lang="en-US"/>
           </a:p>
         </p:txBody>
       </p:sp>
@@ -1390,6 +1405,7 @@
           <a:p>
             <a:fld id="{63A1C593-65D0-4073-BCC9-577B9352EA97}" type="datetimeFigureOut">
               <a:rPr lang="en-US" smtClean="0"/>
+              <a:t>9/25/2023</a:t>
             </a:fld>
             <a:endParaRPr lang="en-US"/>
           </a:p>
@@ -1431,6 +1447,7 @@
           <a:p>
             <a:fld id="{9B618960-8005-486C-9A75-10CB2AAC16F9}" type="slidenum">
               <a:rPr lang="en-US" smtClean="0"/>
+              <a:t>‹#›</a:t>
             </a:fld>
             <a:endParaRPr lang="en-US"/>
           </a:p>
@@ -1482,10 +1499,9 @@
           <a:lstStyle/>
           <a:p>
             <a:r>
-              <a:rPr lang="en-US" smtClean="0"/>
+              <a:rPr lang="en-US"/>
               <a:t>Click to edit Master title style</a:t>
             </a:r>
-            <a:endParaRPr lang="en-US"/>
           </a:p>
         </p:txBody>
       </p:sp>
@@ -1548,10 +1564,9 @@
           <a:p>
             <a:pPr lvl="0"/>
             <a:r>
-              <a:rPr lang="en-US" smtClean="0"/>
+              <a:rPr lang="en-US"/>
               <a:t>Click to edit Master text styles</a:t>
             </a:r>
-            <a:endParaRPr lang="en-US" smtClean="0"/>
           </a:p>
         </p:txBody>
       </p:sp>
@@ -1577,42 +1592,37 @@
           <a:p>
             <a:pPr lvl="0"/>
             <a:r>
-              <a:rPr lang="en-US" smtClean="0"/>
+              <a:rPr lang="en-US"/>
               <a:t>Click to edit Master text styles</a:t>
             </a:r>
-            <a:endParaRPr lang="en-US" smtClean="0"/>
           </a:p>
           <a:p>
             <a:pPr lvl="1"/>
             <a:r>
-              <a:rPr lang="en-US" smtClean="0"/>
+              <a:rPr lang="en-US"/>
               <a:t>Second level</a:t>
             </a:r>
-            <a:endParaRPr lang="en-US" smtClean="0"/>
           </a:p>
           <a:p>
             <a:pPr lvl="2"/>
             <a:r>
-              <a:rPr lang="en-US" smtClean="0"/>
+              <a:rPr lang="en-US"/>
               <a:t>Third level</a:t>
             </a:r>
-            <a:endParaRPr lang="en-US" smtClean="0"/>
           </a:p>
           <a:p>
             <a:pPr lvl="3"/>
             <a:r>
-              <a:rPr lang="en-US" smtClean="0"/>
+              <a:rPr lang="en-US"/>
               <a:t>Fourth level</a:t>
             </a:r>
-            <a:endParaRPr lang="en-US" smtClean="0"/>
           </a:p>
           <a:p>
             <a:pPr lvl="4"/>
             <a:r>
-              <a:rPr lang="en-US" smtClean="0"/>
+              <a:rPr lang="en-US"/>
               <a:t>Fifth level</a:t>
             </a:r>
-            <a:endParaRPr lang="en-US"/>
           </a:p>
         </p:txBody>
       </p:sp>
@@ -1675,10 +1685,9 @@
           <a:p>
             <a:pPr lvl="0"/>
             <a:r>
-              <a:rPr lang="en-US" smtClean="0"/>
+              <a:rPr lang="en-US"/>
               <a:t>Click to edit Master text styles</a:t>
             </a:r>
-            <a:endParaRPr lang="en-US" smtClean="0"/>
           </a:p>
         </p:txBody>
       </p:sp>
@@ -1704,42 +1713,37 @@
           <a:p>
             <a:pPr lvl="0"/>
             <a:r>
-              <a:rPr lang="en-US" smtClean="0"/>
+              <a:rPr lang="en-US"/>
               <a:t>Click to edit Master text styles</a:t>
             </a:r>
-            <a:endParaRPr lang="en-US" smtClean="0"/>
           </a:p>
           <a:p>
             <a:pPr lvl="1"/>
             <a:r>
-              <a:rPr lang="en-US" smtClean="0"/>
+              <a:rPr lang="en-US"/>
               <a:t>Second level</a:t>
             </a:r>
-            <a:endParaRPr lang="en-US" smtClean="0"/>
           </a:p>
           <a:p>
             <a:pPr lvl="2"/>
             <a:r>
-              <a:rPr lang="en-US" smtClean="0"/>
+              <a:rPr lang="en-US"/>
               <a:t>Third level</a:t>
             </a:r>
-            <a:endParaRPr lang="en-US" smtClean="0"/>
           </a:p>
           <a:p>
             <a:pPr lvl="3"/>
             <a:r>
-              <a:rPr lang="en-US" smtClean="0"/>
+              <a:rPr lang="en-US"/>
               <a:t>Fourth level</a:t>
             </a:r>
-            <a:endParaRPr lang="en-US" smtClean="0"/>
           </a:p>
           <a:p>
             <a:pPr lvl="4"/>
             <a:r>
-              <a:rPr lang="en-US" smtClean="0"/>
+              <a:rPr lang="en-US"/>
               <a:t>Fifth level</a:t>
             </a:r>
-            <a:endParaRPr lang="en-US"/>
           </a:p>
         </p:txBody>
       </p:sp>
@@ -1760,6 +1764,7 @@
           <a:p>
             <a:fld id="{63A1C593-65D0-4073-BCC9-577B9352EA97}" type="datetimeFigureOut">
               <a:rPr lang="en-US" smtClean="0"/>
+              <a:t>9/25/2023</a:t>
             </a:fld>
             <a:endParaRPr lang="en-US"/>
           </a:p>
@@ -1801,6 +1806,7 @@
           <a:p>
             <a:fld id="{9B618960-8005-486C-9A75-10CB2AAC16F9}" type="slidenum">
               <a:rPr lang="en-US" smtClean="0"/>
+              <a:t>‹#›</a:t>
             </a:fld>
             <a:endParaRPr lang="en-US"/>
           </a:p>
@@ -1847,10 +1853,9 @@
           <a:lstStyle/>
           <a:p>
             <a:r>
-              <a:rPr lang="en-US" smtClean="0"/>
+              <a:rPr lang="en-US"/>
               <a:t>Click to edit Master title style</a:t>
             </a:r>
-            <a:endParaRPr lang="en-US"/>
           </a:p>
         </p:txBody>
       </p:sp>
@@ -1871,6 +1876,7 @@
           <a:p>
             <a:fld id="{63A1C593-65D0-4073-BCC9-577B9352EA97}" type="datetimeFigureOut">
               <a:rPr lang="en-US" smtClean="0"/>
+              <a:t>9/25/2023</a:t>
             </a:fld>
             <a:endParaRPr lang="en-US"/>
           </a:p>
@@ -1912,6 +1918,7 @@
           <a:p>
             <a:fld id="{9B618960-8005-486C-9A75-10CB2AAC16F9}" type="slidenum">
               <a:rPr lang="en-US" smtClean="0"/>
+              <a:t>‹#›</a:t>
             </a:fld>
             <a:endParaRPr lang="en-US"/>
           </a:p>
@@ -1959,6 +1966,7 @@
           <a:p>
             <a:fld id="{63A1C593-65D0-4073-BCC9-577B9352EA97}" type="datetimeFigureOut">
               <a:rPr lang="en-US" smtClean="0"/>
+              <a:t>9/25/2023</a:t>
             </a:fld>
             <a:endParaRPr lang="en-US"/>
           </a:p>
@@ -2000,6 +2008,7 @@
           <a:p>
             <a:fld id="{9B618960-8005-486C-9A75-10CB2AAC16F9}" type="slidenum">
               <a:rPr lang="en-US" smtClean="0"/>
+              <a:t>‹#›</a:t>
             </a:fld>
             <a:endParaRPr lang="en-US"/>
           </a:p>
@@ -2055,10 +2064,9 @@
           </a:lstStyle>
           <a:p>
             <a:r>
-              <a:rPr lang="en-US" smtClean="0"/>
+              <a:rPr lang="en-US"/>
               <a:t>Click to edit Master title style</a:t>
             </a:r>
-            <a:endParaRPr lang="en-US"/>
           </a:p>
         </p:txBody>
       </p:sp>
@@ -2112,42 +2120,37 @@
           <a:p>
             <a:pPr lvl="0"/>
             <a:r>
-              <a:rPr lang="en-US" smtClean="0"/>
+              <a:rPr lang="en-US"/>
               <a:t>Click to edit Master text styles</a:t>
             </a:r>
-            <a:endParaRPr lang="en-US" smtClean="0"/>
           </a:p>
           <a:p>
             <a:pPr lvl="1"/>
             <a:r>
-              <a:rPr lang="en-US" smtClean="0"/>
+              <a:rPr lang="en-US"/>
               <a:t>Second level</a:t>
             </a:r>
-            <a:endParaRPr lang="en-US" smtClean="0"/>
           </a:p>
           <a:p>
             <a:pPr lvl="2"/>
             <a:r>
-              <a:rPr lang="en-US" smtClean="0"/>
+              <a:rPr lang="en-US"/>
               <a:t>Third level</a:t>
             </a:r>
-            <a:endParaRPr lang="en-US" smtClean="0"/>
           </a:p>
           <a:p>
             <a:pPr lvl="3"/>
             <a:r>
-              <a:rPr lang="en-US" smtClean="0"/>
+              <a:rPr lang="en-US"/>
               <a:t>Fourth level</a:t>
             </a:r>
-            <a:endParaRPr lang="en-US" smtClean="0"/>
           </a:p>
           <a:p>
             <a:pPr lvl="4"/>
             <a:r>
-              <a:rPr lang="en-US" smtClean="0"/>
+              <a:rPr lang="en-US"/>
               <a:t>Fifth level</a:t>
             </a:r>
-            <a:endParaRPr lang="en-US"/>
           </a:p>
         </p:txBody>
       </p:sp>
@@ -2210,10 +2213,9 @@
           <a:p>
             <a:pPr lvl="0"/>
             <a:r>
-              <a:rPr lang="en-US" smtClean="0"/>
+              <a:rPr lang="en-US"/>
               <a:t>Click to edit Master text styles</a:t>
             </a:r>
-            <a:endParaRPr lang="en-US" smtClean="0"/>
           </a:p>
         </p:txBody>
       </p:sp>
@@ -2234,6 +2236,7 @@
           <a:p>
             <a:fld id="{63A1C593-65D0-4073-BCC9-577B9352EA97}" type="datetimeFigureOut">
               <a:rPr lang="en-US" smtClean="0"/>
+              <a:t>9/25/2023</a:t>
             </a:fld>
             <a:endParaRPr lang="en-US"/>
           </a:p>
@@ -2275,6 +2278,7 @@
           <a:p>
             <a:fld id="{9B618960-8005-486C-9A75-10CB2AAC16F9}" type="slidenum">
               <a:rPr lang="en-US" smtClean="0"/>
+              <a:t>‹#›</a:t>
             </a:fld>
             <a:endParaRPr lang="en-US"/>
           </a:p>
@@ -2330,10 +2334,9 @@
           </a:lstStyle>
           <a:p>
             <a:r>
-              <a:rPr lang="en-US" smtClean="0"/>
+              <a:rPr lang="en-US"/>
               <a:t>Click to edit Master title style</a:t>
             </a:r>
-            <a:endParaRPr lang="en-US"/>
           </a:p>
         </p:txBody>
       </p:sp>
@@ -2457,10 +2460,9 @@
           <a:p>
             <a:pPr lvl="0"/>
             <a:r>
-              <a:rPr lang="en-US" smtClean="0"/>
+              <a:rPr lang="en-US"/>
               <a:t>Click to edit Master text styles</a:t>
             </a:r>
-            <a:endParaRPr lang="en-US" smtClean="0"/>
           </a:p>
         </p:txBody>
       </p:sp>
@@ -2481,6 +2483,7 @@
           <a:p>
             <a:fld id="{63A1C593-65D0-4073-BCC9-577B9352EA97}" type="datetimeFigureOut">
               <a:rPr lang="en-US" smtClean="0"/>
+              <a:t>9/25/2023</a:t>
             </a:fld>
             <a:endParaRPr lang="en-US"/>
           </a:p>
@@ -2522,6 +2525,7 @@
           <a:p>
             <a:fld id="{9B618960-8005-486C-9A75-10CB2AAC16F9}" type="slidenum">
               <a:rPr lang="en-US" smtClean="0"/>
+              <a:t>‹#›</a:t>
             </a:fld>
             <a:endParaRPr lang="en-US"/>
           </a:p>
@@ -2583,10 +2587,9 @@
           <a:lstStyle/>
           <a:p>
             <a:r>
-              <a:rPr lang="en-US" smtClean="0"/>
+              <a:rPr lang="en-US"/>
               <a:t>Click to edit Master title style</a:t>
             </a:r>
-            <a:endParaRPr lang="en-US"/>
           </a:p>
         </p:txBody>
       </p:sp>
@@ -2617,42 +2620,37 @@
           <a:p>
             <a:pPr lvl="0"/>
             <a:r>
-              <a:rPr lang="en-US" smtClean="0"/>
+              <a:rPr lang="en-US"/>
               <a:t>Click to edit Master text styles</a:t>
             </a:r>
-            <a:endParaRPr lang="en-US" smtClean="0"/>
           </a:p>
           <a:p>
             <a:pPr lvl="1"/>
             <a:r>
-              <a:rPr lang="en-US" smtClean="0"/>
+              <a:rPr lang="en-US"/>
               <a:t>Second level</a:t>
             </a:r>
-            <a:endParaRPr lang="en-US" smtClean="0"/>
           </a:p>
           <a:p>
             <a:pPr lvl="2"/>
             <a:r>
-              <a:rPr lang="en-US" smtClean="0"/>
+              <a:rPr lang="en-US"/>
               <a:t>Third level</a:t>
             </a:r>
-            <a:endParaRPr lang="en-US" smtClean="0"/>
           </a:p>
           <a:p>
             <a:pPr lvl="3"/>
             <a:r>
-              <a:rPr lang="en-US" smtClean="0"/>
+              <a:rPr lang="en-US"/>
               <a:t>Fourth level</a:t>
             </a:r>
-            <a:endParaRPr lang="en-US" smtClean="0"/>
           </a:p>
           <a:p>
             <a:pPr lvl="4"/>
             <a:r>
-              <a:rPr lang="en-US" smtClean="0"/>
+              <a:rPr lang="en-US"/>
               <a:t>Fifth level</a:t>
             </a:r>
-            <a:endParaRPr lang="en-US"/>
           </a:p>
         </p:txBody>
       </p:sp>
@@ -2691,6 +2689,7 @@
           <a:p>
             <a:fld id="{63A1C593-65D0-4073-BCC9-577B9352EA97}" type="datetimeFigureOut">
               <a:rPr lang="en-US" smtClean="0"/>
+              <a:t>9/25/2023</a:t>
             </a:fld>
             <a:endParaRPr lang="en-US"/>
           </a:p>
@@ -2768,6 +2767,7 @@
           <a:p>
             <a:fld id="{9B618960-8005-486C-9A75-10CB2AAC16F9}" type="slidenum">
               <a:rPr lang="en-US" smtClean="0"/>
+              <a:t>‹#›</a:t>
             </a:fld>
             <a:endParaRPr lang="en-US"/>
           </a:p>
@@ -3082,7 +3082,14 @@
         <p:cNvGrpSpPr/>
         <p:nvPr/>
       </p:nvGrpSpPr>
-      <p:grpSpPr/>
+      <p:grpSpPr>
+        <a:xfrm>
+          <a:off x="0" y="0"/>
+          <a:ext cx="0" cy="0"/>
+          <a:chOff x="0" y="0"/>
+          <a:chExt cx="0" cy="0"/>
+        </a:xfrm>
+      </p:grpSpPr>
       <p:sp>
         <p:nvSpPr>
           <p:cNvPr id="4" name="Title 3"/>
@@ -3096,8 +3103,8 @@
         <p:spPr/>
         <p:txBody>
           <a:bodyPr/>
-          <a:p>
-            <a:pPr algn="ctr"/>
+          <a:lstStyle/>
+          <a:p>
             <a:r>
               <a:rPr lang="en-US" b="1" dirty="0">
                 <a:latin typeface="+mn-lt"/>
@@ -3106,7 +3113,7 @@
               </a:rPr>
               <a:t>Presentation 3 Project Rubric</a:t>
             </a:r>
-            <a:endParaRPr lang="en-US">
+            <a:endParaRPr lang="en-US" dirty="0">
               <a:latin typeface="+mn-lt"/>
               <a:cs typeface="+mn-lt"/>
             </a:endParaRPr>
@@ -3116,14 +3123,16 @@
       <p:graphicFrame>
         <p:nvGraphicFramePr>
           <p:cNvPr id="6" name="Content Placeholder 5"/>
-          <p:cNvGraphicFramePr/>
+          <p:cNvGraphicFramePr>
+            <a:graphicFrameLocks noGrp="1"/>
+          </p:cNvGraphicFramePr>
           <p:nvPr>
             <p:ph idx="1"/>
           </p:nvPr>
         </p:nvGraphicFramePr>
         <p:xfrm>
           <a:off x="327025" y="1825625"/>
-          <a:ext cx="11702415" cy="3060065"/>
+          <a:ext cx="11702415" cy="4373880"/>
         </p:xfrm>
         <a:graphic>
           <a:graphicData uri="http://schemas.openxmlformats.org/drawingml/2006/table">
@@ -3132,14 +3141,33 @@
                 <a:tableStyleId>{5940675A-B579-460E-94D1-54222C63F5DA}</a:tableStyleId>
               </a:tblPr>
               <a:tblGrid>
-                <a:gridCol w="4454525"/>
-                <a:gridCol w="2628900"/>
-                <a:gridCol w="4618990"/>
+                <a:gridCol w="4454525">
+                  <a:extLst>
+                    <a:ext uri="{9D8B030D-6E8A-4147-A177-3AD203B41FA5}">
+                      <a16:colId xmlns:a16="http://schemas.microsoft.com/office/drawing/2014/main" val="20000"/>
+                    </a:ext>
+                  </a:extLst>
+                </a:gridCol>
+                <a:gridCol w="2628900">
+                  <a:extLst>
+                    <a:ext uri="{9D8B030D-6E8A-4147-A177-3AD203B41FA5}">
+                      <a16:colId xmlns:a16="http://schemas.microsoft.com/office/drawing/2014/main" val="20001"/>
+                    </a:ext>
+                  </a:extLst>
+                </a:gridCol>
+                <a:gridCol w="4618990">
+                  <a:extLst>
+                    <a:ext uri="{9D8B030D-6E8A-4147-A177-3AD203B41FA5}">
+                      <a16:colId xmlns:a16="http://schemas.microsoft.com/office/drawing/2014/main" val="20002"/>
+                    </a:ext>
+                  </a:extLst>
+                </a:gridCol>
               </a:tblGrid>
               <a:tr h="381000">
                 <a:tc>
                   <a:txBody>
                     <a:bodyPr/>
+                    <a:lstStyle/>
                     <a:p>
                       <a:pPr algn="ctr">
                         <a:lnSpc>
@@ -3151,7 +3179,6 @@
                         <a:rPr lang="en-US" b="1"/>
                         <a:t>Content</a:t>
                       </a:r>
-                      <a:endParaRPr lang="en-US" b="1"/>
                     </a:p>
                   </a:txBody>
                   <a:tcPr/>
@@ -3159,6 +3186,7 @@
                 <a:tc>
                   <a:txBody>
                     <a:bodyPr/>
+                    <a:lstStyle/>
                     <a:p>
                       <a:pPr algn="ctr">
                         <a:lnSpc>
@@ -3170,7 +3198,6 @@
                         <a:rPr lang="en-US" b="1"/>
                         <a:t>Design</a:t>
                       </a:r>
-                      <a:endParaRPr lang="en-US" b="1"/>
                     </a:p>
                   </a:txBody>
                   <a:tcPr/>
@@ -3178,6 +3205,7 @@
                 <a:tc>
                   <a:txBody>
                     <a:bodyPr/>
+                    <a:lstStyle/>
                     <a:p>
                       <a:pPr algn="ctr">
                         <a:lnSpc>
@@ -3189,23 +3217,27 @@
                         <a:rPr lang="en-US" b="1"/>
                         <a:t>Technical Expertise</a:t>
                       </a:r>
-                      <a:endParaRPr lang="en-US" b="1"/>
                     </a:p>
                   </a:txBody>
                   <a:tcPr/>
                 </a:tc>
+                <a:extLst>
+                  <a:ext uri="{0D108BD9-81ED-4DB2-BD59-A6C34878D82A}">
+                    <a16:rowId xmlns:a16="http://schemas.microsoft.com/office/drawing/2014/main" val="10000"/>
+                  </a:ext>
+                </a:extLst>
               </a:tr>
               <a:tr h="381000">
                 <a:tc>
                   <a:txBody>
                     <a:bodyPr/>
+                    <a:lstStyle/>
                     <a:p>
                       <a:pPr lvl="1"/>
                       <a:r>
                         <a:rPr lang="en-US" sz="1400"/>
                         <a:t>3: Project includes all of the following pages: </a:t>
                       </a:r>
-                      <a:endParaRPr lang="en-US" sz="1400"/>
                     </a:p>
                     <a:p>
                       <a:pPr lvl="1"/>
@@ -3225,9 +3257,6 @@
                         </a:rPr>
                         <a:t>- A page showing all items</a:t>
                       </a:r>
-                      <a:endParaRPr lang="en-US" sz="1400">
-                        <a:sym typeface="+mn-ea"/>
-                      </a:endParaRPr>
                     </a:p>
                     <a:p>
                       <a:pPr lvl="1"/>
@@ -3237,9 +3266,6 @@
                         </a:rPr>
                         <a:t>- A page showing sale items</a:t>
                       </a:r>
-                      <a:endParaRPr lang="en-US" sz="1400">
-                        <a:sym typeface="+mn-ea"/>
-                      </a:endParaRPr>
                     </a:p>
                     <a:p>
                       <a:pPr lvl="1"/>
@@ -3249,9 +3275,6 @@
                         </a:rPr>
                         <a:t>- A page showing new items</a:t>
                       </a:r>
-                      <a:endParaRPr lang="en-US" sz="1400">
-                        <a:sym typeface="+mn-ea"/>
-                      </a:endParaRPr>
                     </a:p>
                     <a:p>
                       <a:pPr lvl="1"/>
@@ -3278,6 +3301,7 @@
                 <a:tc>
                   <a:txBody>
                     <a:bodyPr/>
+                    <a:lstStyle/>
                     <a:p>
                       <a:pPr algn="ctr">
                         <a:lnSpc>
@@ -3289,7 +3313,6 @@
                         <a:rPr lang="en-US"/>
                         <a:t>3: Design and user flow of the website is intuitive and causes minimal frustration to the user</a:t>
                       </a:r>
-                      <a:endParaRPr lang="en-US"/>
                     </a:p>
                   </a:txBody>
                   <a:tcPr/>
@@ -3297,6 +3320,7 @@
                 <a:tc>
                   <a:txBody>
                     <a:bodyPr/>
+                    <a:lstStyle/>
                     <a:p>
                       <a:pPr algn="ctr">
                         <a:lnSpc>
@@ -3308,16 +3332,21 @@
                         <a:rPr lang="en-US"/>
                         <a:t>3: Project makes use of a majority of web design components discussed in class in a way that makes sense for the design of the project</a:t>
                       </a:r>
-                      <a:endParaRPr lang="en-US"/>
                     </a:p>
                   </a:txBody>
                   <a:tcPr/>
                 </a:tc>
+                <a:extLst>
+                  <a:ext uri="{0D108BD9-81ED-4DB2-BD59-A6C34878D82A}">
+                    <a16:rowId xmlns:a16="http://schemas.microsoft.com/office/drawing/2014/main" val="10001"/>
+                  </a:ext>
+                </a:extLst>
               </a:tr>
               <a:tr h="381000">
                 <a:tc>
                   <a:txBody>
                     <a:bodyPr/>
+                    <a:lstStyle/>
                     <a:p>
                       <a:pPr algn="ctr">
                         <a:lnSpc>
@@ -3329,7 +3358,6 @@
                         <a:rPr lang="en-US"/>
                         <a:t>2: Project is missing up to two of the above pages</a:t>
                       </a:r>
-                      <a:endParaRPr lang="en-US"/>
                     </a:p>
                   </a:txBody>
                   <a:tcPr/>
@@ -3337,6 +3365,7 @@
                 <a:tc>
                   <a:txBody>
                     <a:bodyPr/>
+                    <a:lstStyle/>
                     <a:p>
                       <a:pPr algn="ctr">
                         <a:lnSpc>
@@ -3348,7 +3377,6 @@
                         <a:rPr lang="en-US"/>
                         <a:t>2: Up to two instances of poor design</a:t>
                       </a:r>
-                      <a:endParaRPr lang="en-US"/>
                     </a:p>
                   </a:txBody>
                   <a:tcPr/>
@@ -3356,6 +3384,7 @@
                 <a:tc>
                   <a:txBody>
                     <a:bodyPr/>
+                    <a:lstStyle/>
                     <a:p>
                       <a:pPr algn="ctr">
                         <a:lnSpc>
@@ -3367,16 +3396,21 @@
                         <a:rPr lang="en-US"/>
                         <a:t>2: N/A </a:t>
                       </a:r>
-                      <a:endParaRPr lang="en-US"/>
                     </a:p>
                   </a:txBody>
                   <a:tcPr/>
                 </a:tc>
+                <a:extLst>
+                  <a:ext uri="{0D108BD9-81ED-4DB2-BD59-A6C34878D82A}">
+                    <a16:rowId xmlns:a16="http://schemas.microsoft.com/office/drawing/2014/main" val="10002"/>
+                  </a:ext>
+                </a:extLst>
               </a:tr>
               <a:tr h="381000">
                 <a:tc>
                   <a:txBody>
                     <a:bodyPr/>
+                    <a:lstStyle/>
                     <a:p>
                       <a:pPr algn="ctr">
                         <a:lnSpc>
@@ -3388,7 +3422,6 @@
                         <a:rPr lang="en-US"/>
                         <a:t>1: Project is missing up to three of the above pages</a:t>
                       </a:r>
-                      <a:endParaRPr lang="en-US"/>
                     </a:p>
                   </a:txBody>
                   <a:tcPr/>
@@ -3396,6 +3429,7 @@
                 <a:tc>
                   <a:txBody>
                     <a:bodyPr/>
+                    <a:lstStyle/>
                     <a:p>
                       <a:pPr algn="ctr">
                         <a:lnSpc>
@@ -3407,7 +3441,6 @@
                         <a:rPr lang="en-US"/>
                         <a:t>1: Up to five instances of poor design</a:t>
                       </a:r>
-                      <a:endParaRPr lang="en-US"/>
                     </a:p>
                   </a:txBody>
                   <a:tcPr/>
@@ -3415,6 +3448,7 @@
                 <a:tc>
                   <a:txBody>
                     <a:bodyPr/>
+                    <a:lstStyle/>
                     <a:p>
                       <a:pPr algn="ctr">
                         <a:lnSpc>
@@ -3426,16 +3460,21 @@
                         <a:rPr lang="en-US"/>
                         <a:t>1: N/A</a:t>
                       </a:r>
-                      <a:endParaRPr lang="en-US"/>
                     </a:p>
                   </a:txBody>
                   <a:tcPr/>
                 </a:tc>
+                <a:extLst>
+                  <a:ext uri="{0D108BD9-81ED-4DB2-BD59-A6C34878D82A}">
+                    <a16:rowId xmlns:a16="http://schemas.microsoft.com/office/drawing/2014/main" val="10003"/>
+                  </a:ext>
+                </a:extLst>
               </a:tr>
               <a:tr h="381000">
                 <a:tc>
                   <a:txBody>
                     <a:bodyPr/>
+                    <a:lstStyle/>
                     <a:p>
                       <a:pPr algn="ctr">
                         <a:lnSpc>
@@ -3447,7 +3486,6 @@
                         <a:rPr lang="en-US"/>
                         <a:t>0: Project is missing more than three pages or was not attempted</a:t>
                       </a:r>
-                      <a:endParaRPr lang="en-US"/>
                     </a:p>
                   </a:txBody>
                   <a:tcPr/>
@@ -3455,6 +3493,7 @@
                 <a:tc>
                   <a:txBody>
                     <a:bodyPr/>
+                    <a:lstStyle/>
                     <a:p>
                       <a:pPr algn="ctr">
                         <a:lnSpc>
@@ -3466,7 +3505,6 @@
                         <a:rPr lang="en-US"/>
                         <a:t>0: More than five instances of poor design or was not attempted</a:t>
                       </a:r>
-                      <a:endParaRPr lang="en-US"/>
                     </a:p>
                   </a:txBody>
                   <a:tcPr/>
@@ -3474,6 +3512,7 @@
                 <a:tc>
                   <a:txBody>
                     <a:bodyPr/>
+                    <a:lstStyle/>
                     <a:p>
                       <a:pPr algn="ctr">
                         <a:lnSpc>
@@ -3485,16 +3524,69 @@
                         <a:rPr lang="en-US"/>
                         <a:t>0: Project uses little to no web design components discussed in class or was not attempted</a:t>
                       </a:r>
-                      <a:endParaRPr lang="en-US"/>
                     </a:p>
                   </a:txBody>
                   <a:tcPr/>
                 </a:tc>
+                <a:extLst>
+                  <a:ext uri="{0D108BD9-81ED-4DB2-BD59-A6C34878D82A}">
+                    <a16:rowId xmlns:a16="http://schemas.microsoft.com/office/drawing/2014/main" val="10004"/>
+                  </a:ext>
+                </a:extLst>
               </a:tr>
             </a:tbl>
           </a:graphicData>
         </a:graphic>
       </p:graphicFrame>
+      <p:sp>
+        <p:nvSpPr>
+          <p:cNvPr id="2" name="Ribbon: Tilted Up 1">
+            <a:extLst>
+              <a:ext uri="{FF2B5EF4-FFF2-40B4-BE49-F238E27FC236}">
+                <a16:creationId xmlns:a16="http://schemas.microsoft.com/office/drawing/2014/main" id="{75A141FB-0E86-4FCA-9332-AB79C4E3501B}"/>
+              </a:ext>
+            </a:extLst>
+          </p:cNvPr>
+          <p:cNvSpPr/>
+          <p:nvPr/>
+        </p:nvSpPr>
+        <p:spPr>
+          <a:xfrm>
+            <a:off x="8221211" y="113557"/>
+            <a:ext cx="3607267" cy="1484852"/>
+          </a:xfrm>
+          <a:prstGeom prst="ribbon2">
+            <a:avLst/>
+          </a:prstGeom>
+        </p:spPr>
+        <p:style>
+          <a:lnRef idx="2">
+            <a:schemeClr val="accent4">
+              <a:shade val="50000"/>
+            </a:schemeClr>
+          </a:lnRef>
+          <a:fillRef idx="1">
+            <a:schemeClr val="accent4"/>
+          </a:fillRef>
+          <a:effectRef idx="0">
+            <a:schemeClr val="accent4"/>
+          </a:effectRef>
+          <a:fontRef idx="minor">
+            <a:schemeClr val="lt1"/>
+          </a:fontRef>
+        </p:style>
+        <p:txBody>
+          <a:bodyPr rtlCol="0" anchor="ctr"/>
+          <a:lstStyle/>
+          <a:p>
+            <a:pPr algn="ctr"/>
+            <a:r>
+              <a:rPr lang="en-US" dirty="0"/>
+              <a:t>Up to 3 BONUS POINTS for creativity and originality</a:t>
+            </a:r>
+          </a:p>
+        </p:txBody>
+      </p:sp>
     </p:spTree>
   </p:cSld>
   <p:clrMapOvr>
@@ -3530,7 +3622,7 @@
         </p:nvGraphicFramePr>
         <p:xfrm>
           <a:off x="2242982" y="1280160"/>
-          <a:ext cx="10276516" cy="4572000"/>
+          <a:ext cx="7707387" cy="4572000"/>
         </p:xfrm>
         <a:graphic>
           <a:graphicData uri="http://schemas.openxmlformats.org/drawingml/2006/table">
@@ -3539,9 +3631,27 @@
                 <a:tableStyleId>{5940675A-B579-460E-94D1-54222C63F5DA}</a:tableStyleId>
               </a:tblPr>
               <a:tblGrid>
-                <a:gridCol w="2569129"/>
-                <a:gridCol w="2569129"/>
-                <a:gridCol w="2569129"/>
+                <a:gridCol w="2569129">
+                  <a:extLst>
+                    <a:ext uri="{9D8B030D-6E8A-4147-A177-3AD203B41FA5}">
+                      <a16:colId xmlns:a16="http://schemas.microsoft.com/office/drawing/2014/main" val="20000"/>
+                    </a:ext>
+                  </a:extLst>
+                </a:gridCol>
+                <a:gridCol w="2569129">
+                  <a:extLst>
+                    <a:ext uri="{9D8B030D-6E8A-4147-A177-3AD203B41FA5}">
+                      <a16:colId xmlns:a16="http://schemas.microsoft.com/office/drawing/2014/main" val="20001"/>
+                    </a:ext>
+                  </a:extLst>
+                </a:gridCol>
+                <a:gridCol w="2569129">
+                  <a:extLst>
+                    <a:ext uri="{9D8B030D-6E8A-4147-A177-3AD203B41FA5}">
+                      <a16:colId xmlns:a16="http://schemas.microsoft.com/office/drawing/2014/main" val="20002"/>
+                    </a:ext>
+                  </a:extLst>
+                </a:gridCol>
               </a:tblGrid>
               <a:tr h="370840">
                 <a:tc>
@@ -3554,7 +3664,6 @@
                         <a:rPr lang="en-US" dirty="0"/>
                         <a:t>Presentation Skills</a:t>
                       </a:r>
-                      <a:endParaRPr lang="en-US" dirty="0"/>
                     </a:p>
                   </a:txBody>
                   <a:tcPr/>
@@ -3569,7 +3678,6 @@
                         <a:rPr lang="en-US" dirty="0"/>
                         <a:t>Knowledge</a:t>
                       </a:r>
-                      <a:endParaRPr lang="en-US" dirty="0"/>
                     </a:p>
                   </a:txBody>
                   <a:tcPr/>
@@ -3599,11 +3707,15 @@
                         <a:rPr lang="en-US" dirty="0"/>
                         <a:t>Team Synergy (solo = instant 3)</a:t>
                       </a:r>
-                      <a:endParaRPr lang="en-US" dirty="0"/>
                     </a:p>
                   </a:txBody>
                   <a:tcPr/>
                 </a:tc>
+                <a:extLst>
+                  <a:ext uri="{0D108BD9-81ED-4DB2-BD59-A6C34878D82A}">
+                    <a16:rowId xmlns:a16="http://schemas.microsoft.com/office/drawing/2014/main" val="10000"/>
+                  </a:ext>
+                </a:extLst>
               </a:tr>
               <a:tr h="370840">
                 <a:tc>
@@ -3616,7 +3728,6 @@
                         <a:rPr lang="en-US" dirty="0"/>
                         <a:t>3 – presenter(s) had less than 3 awkward pauses and filler words</a:t>
                       </a:r>
-                      <a:endParaRPr lang="en-US" dirty="0"/>
                     </a:p>
                   </a:txBody>
                   <a:tcPr/>
@@ -3631,7 +3742,6 @@
                         <a:rPr lang="en-US" dirty="0"/>
                         <a:t>3 – presenter(s) answered all student and teacher questions sufficiently</a:t>
                       </a:r>
-                      <a:endParaRPr lang="en-US" dirty="0"/>
                     </a:p>
                   </a:txBody>
                   <a:tcPr/>
@@ -3661,11 +3771,15 @@
                         <a:rPr lang="en-US" dirty="0"/>
                         <a:t>3 – presenter(s) distributed work evenly amongst themselves</a:t>
                       </a:r>
-                      <a:endParaRPr lang="en-US" dirty="0"/>
                     </a:p>
                   </a:txBody>
                   <a:tcPr/>
                 </a:tc>
+                <a:extLst>
+                  <a:ext uri="{0D108BD9-81ED-4DB2-BD59-A6C34878D82A}">
+                    <a16:rowId xmlns:a16="http://schemas.microsoft.com/office/drawing/2014/main" val="10001"/>
+                  </a:ext>
+                </a:extLst>
               </a:tr>
               <a:tr h="370840">
                 <a:tc>
@@ -3678,7 +3792,6 @@
                         <a:rPr lang="en-US" dirty="0"/>
                         <a:t>2 – up to 5 occasions</a:t>
                       </a:r>
-                      <a:endParaRPr lang="en-US" dirty="0"/>
                     </a:p>
                   </a:txBody>
                   <a:tcPr/>
@@ -3693,7 +3806,6 @@
                         <a:rPr lang="en-US" dirty="0"/>
                         <a:t>2 – up to 2 occasions of insufficient answers given</a:t>
                       </a:r>
-                      <a:endParaRPr lang="en-US" dirty="0"/>
                     </a:p>
                   </a:txBody>
                   <a:tcPr/>
@@ -3723,11 +3835,15 @@
                         <a:rPr lang="en-US" dirty="0"/>
                         <a:t>N/A</a:t>
                       </a:r>
-                      <a:endParaRPr lang="en-US" dirty="0"/>
                     </a:p>
                   </a:txBody>
                   <a:tcPr/>
                 </a:tc>
+                <a:extLst>
+                  <a:ext uri="{0D108BD9-81ED-4DB2-BD59-A6C34878D82A}">
+                    <a16:rowId xmlns:a16="http://schemas.microsoft.com/office/drawing/2014/main" val="10002"/>
+                  </a:ext>
+                </a:extLst>
               </a:tr>
               <a:tr h="370840">
                 <a:tc>
@@ -3740,7 +3856,6 @@
                         <a:rPr lang="en-US" dirty="0"/>
                         <a:t>1 – up to 10 occasions</a:t>
                       </a:r>
-                      <a:endParaRPr lang="en-US" dirty="0"/>
                     </a:p>
                   </a:txBody>
                   <a:tcPr/>
@@ -3755,7 +3870,6 @@
                         <a:rPr lang="en-US" dirty="0"/>
                         <a:t>1 – up to 4 occasions given</a:t>
                       </a:r>
-                      <a:endParaRPr lang="en-US" dirty="0"/>
                     </a:p>
                   </a:txBody>
                   <a:tcPr/>
@@ -3793,11 +3907,15 @@
                         <a:rPr lang="en-US" dirty="0"/>
                         <a:t>) did not evenly distribute work amongst themselves</a:t>
                       </a:r>
-                      <a:endParaRPr lang="en-US" dirty="0"/>
                     </a:p>
                   </a:txBody>
                   <a:tcPr/>
                 </a:tc>
+                <a:extLst>
+                  <a:ext uri="{0D108BD9-81ED-4DB2-BD59-A6C34878D82A}">
+                    <a16:rowId xmlns:a16="http://schemas.microsoft.com/office/drawing/2014/main" val="10003"/>
+                  </a:ext>
+                </a:extLst>
               </a:tr>
               <a:tr h="370840">
                 <a:tc>
@@ -3810,7 +3928,6 @@
                         <a:rPr lang="en-US" dirty="0"/>
                         <a:t>0 – more than 10 occasions or not attempted </a:t>
                       </a:r>
-                      <a:endParaRPr lang="en-US" dirty="0"/>
                     </a:p>
                   </a:txBody>
                   <a:tcPr/>
@@ -3825,7 +3942,6 @@
                         <a:rPr lang="en-US" dirty="0"/>
                         <a:t>0 – more than 4 occasions or not attempted</a:t>
                       </a:r>
-                      <a:endParaRPr lang="en-US" dirty="0"/>
                     </a:p>
                   </a:txBody>
                   <a:tcPr/>
@@ -3855,11 +3971,15 @@
                         <a:rPr lang="en-US" dirty="0"/>
                         <a:t>0 – no attempt</a:t>
                       </a:r>
-                      <a:endParaRPr lang="en-US" dirty="0"/>
                     </a:p>
                   </a:txBody>
                   <a:tcPr/>
                 </a:tc>
+                <a:extLst>
+                  <a:ext uri="{0D108BD9-81ED-4DB2-BD59-A6C34878D82A}">
+                    <a16:rowId xmlns:a16="http://schemas.microsoft.com/office/drawing/2014/main" val="10004"/>
+                  </a:ext>
+                </a:extLst>
               </a:tr>
             </a:tbl>
           </a:graphicData>
@@ -4157,6 +4277,8 @@
       </a:bgFillStyleLst>
     </a:fmtScheme>
   </a:themeElements>
+  <a:objectDefaults/>
+  <a:extraClrSchemeLst/>
   <a:extLst>
     <a:ext uri="{05A4C25C-085E-4340-85A3-A5531E510DB2}">
       <thm15:themeFamily xmlns:thm15="http://schemas.microsoft.com/office/thememl/2012/main" name="Office Theme" id="{62F939B6-93AF-4DB8-9C6B-D6C7DFDC589F}" vid="{4A3C46E8-61CC-4603-A589-7422A47A8E4A}"/>

</xml_diff>